<commit_message>
maybe this is the final version for mid report
</commit_message>
<xml_diff>
--- a/record/中期答辩——李龙昊.pptx
+++ b/record/中期答辩——李龙昊.pptx
@@ -19,8 +19,9 @@
     <p:sldId id="288" r:id="rId12"/>
     <p:sldId id="301" r:id="rId13"/>
     <p:sldId id="283" r:id="rId14"/>
-    <p:sldId id="302" r:id="rId15"/>
-    <p:sldId id="282" r:id="rId16"/>
+    <p:sldId id="307" r:id="rId15"/>
+    <p:sldId id="302" r:id="rId16"/>
+    <p:sldId id="282" r:id="rId17"/>
   </p:sldIdLst>
   <p:sldSz cx="12192000" cy="6858000"/>
   <p:notesSz cx="6858000" cy="9144000"/>
@@ -4967,32 +4968,6 @@
             </a:r>
             <a:endParaRPr kumimoji="1" lang="zh-CN" altLang="en-US" dirty="0"/>
           </a:p>
-          <a:p>
-            <a:pPr>
-              <a:buFont typeface="Arial" panose="02080604020202020204" pitchFamily="34" charset="0"/>
-              <a:buChar char="•"/>
-            </a:pPr>
-            <a:r>
-              <a:rPr kumimoji="1" lang="zh-CN" altLang="en-US" dirty="0"/>
-              <a:t>支持尽可能多的</a:t>
-            </a:r>
-            <a:r>
-              <a:rPr kumimoji="1" lang="en-US" altLang="zh-CN" dirty="0"/>
-              <a:t>sel4test</a:t>
-            </a:r>
-            <a:r>
-              <a:rPr kumimoji="1" lang="zh-CN" altLang="en-US" dirty="0"/>
-              <a:t>测例。</a:t>
-            </a:r>
-            <a:endParaRPr kumimoji="1" lang="en-US" altLang="zh-CN" dirty="0"/>
-          </a:p>
-          <a:p>
-            <a:pPr marL="0" indent="0">
-              <a:buFont typeface="Arial" panose="02080604020202020204" pitchFamily="34" charset="0"/>
-              <a:buNone/>
-            </a:pPr>
-            <a:endParaRPr kumimoji="1" lang="zh-CN" altLang="en-US" dirty="0"/>
-          </a:p>
         </p:txBody>
       </p:sp>
       <p:sp>
@@ -5103,78 +5078,21 @@
         </p:nvSpPr>
         <p:spPr>
           <a:xfrm>
-            <a:off x="835307" y="2048614"/>
-            <a:ext cx="10521387" cy="3678303"/>
+            <a:off x="833120" y="2180590"/>
+            <a:ext cx="4358640" cy="3678555"/>
           </a:xfrm>
         </p:spPr>
         <p:txBody>
-          <a:bodyPr>
-            <a:normAutofit/>
-          </a:bodyPr>
-          <a:lstStyle/>
-          <a:p>
+          <a:bodyPr/>
+          <a:lstStyle/>
+          <a:p>
+            <a:pPr>
+              <a:buFont typeface="Arial" panose="02080604020202020204" pitchFamily="34" charset="0"/>
+              <a:buChar char="•"/>
+            </a:pPr>
             <a:r>
               <a:rPr kumimoji="1" lang="zh-CN" altLang="en-US" dirty="0"/>
-              <a:t>中期</a:t>
-            </a:r>
-            <a:r>
-              <a:rPr kumimoji="1" lang="en-US" altLang="zh-CN" dirty="0"/>
-              <a:t>——9</a:t>
-            </a:r>
-            <a:r>
-              <a:rPr kumimoji="1" lang="zh-CN" altLang="en-US" dirty="0"/>
-              <a:t>周</a:t>
-            </a:r>
-            <a:endParaRPr kumimoji="1" lang="en-US" altLang="zh-CN" dirty="0"/>
-          </a:p>
-          <a:p>
-            <a:pPr lvl="1"/>
-            <a:r>
-              <a:rPr kumimoji="1" lang="zh-CN" altLang="en-US" dirty="0"/>
-              <a:t>修改地址空间</a:t>
-            </a:r>
-            <a:r>
-              <a:rPr kumimoji="1" lang="en-US" altLang="zh-CN" dirty="0"/>
-              <a:t>;</a:t>
-            </a:r>
-            <a:r>
-              <a:rPr kumimoji="1" lang="zh-CN" altLang="en-US" dirty="0"/>
-              <a:t>测试</a:t>
-            </a:r>
-            <a:r>
-              <a:rPr kumimoji="1" lang="en-US" altLang="zh-CN" dirty="0"/>
-              <a:t>notification;</a:t>
-            </a:r>
-            <a:r>
-              <a:rPr kumimoji="1" lang="zh-CN" altLang="en-US" dirty="0"/>
-              <a:t>更改启动方式，添加系统调用</a:t>
-            </a:r>
-            <a:endParaRPr kumimoji="1" lang="en-US" altLang="zh-CN" dirty="0"/>
-          </a:p>
-          <a:p>
-            <a:r>
-              <a:rPr kumimoji="1" lang="en-US" altLang="zh-CN" dirty="0"/>
-              <a:t>10</a:t>
-            </a:r>
-            <a:r>
-              <a:rPr kumimoji="1" lang="zh-CN" altLang="en-US" dirty="0"/>
-              <a:t>周</a:t>
-            </a:r>
-            <a:r>
-              <a:rPr kumimoji="1" lang="en-US" altLang="zh-CN" dirty="0"/>
-              <a:t>——15</a:t>
-            </a:r>
-            <a:r>
-              <a:rPr kumimoji="1" lang="zh-CN" altLang="en-US" dirty="0"/>
-              <a:t>周</a:t>
-            </a:r>
-            <a:endParaRPr kumimoji="1" lang="en-US" altLang="zh-CN" dirty="0"/>
-          </a:p>
-          <a:p>
-            <a:pPr lvl="1"/>
-            <a:r>
-              <a:rPr kumimoji="1" lang="zh-CN" altLang="en-US" dirty="0"/>
-              <a:t>使内核支持尽可能多的</a:t>
+              <a:t>支持尽可能多的</a:t>
             </a:r>
             <a:r>
               <a:rPr kumimoji="1" lang="en-US" altLang="zh-CN" dirty="0"/>
@@ -5184,41 +5102,126 @@
               <a:rPr kumimoji="1" lang="zh-CN" altLang="en-US" dirty="0"/>
               <a:t>测例</a:t>
             </a:r>
+            <a:endParaRPr kumimoji="1" lang="zh-CN" altLang="en-US" dirty="0"/>
+          </a:p>
+          <a:p>
+            <a:pPr lvl="1">
+              <a:buFont typeface="Arial" panose="02080604020202020204" pitchFamily="34" charset="0"/>
+              <a:buChar char="•"/>
+            </a:pPr>
+            <a:r>
+              <a:rPr kumimoji="1" lang="zh-CN" altLang="en-US" sz="1600" dirty="0"/>
+              <a:t>用</a:t>
+            </a:r>
+            <a:r>
+              <a:rPr kumimoji="1" lang="en-US" altLang="zh-CN" sz="1600" dirty="0"/>
+              <a:t>rust</a:t>
+            </a:r>
+            <a:r>
+              <a:rPr kumimoji="1" lang="zh-CN" altLang="en-US" sz="1600" dirty="0"/>
+              <a:t>在自己搭建的用户环境中复现</a:t>
+            </a:r>
+            <a:r>
+              <a:rPr kumimoji="1" lang="en-US" altLang="zh-CN" sz="1600" dirty="0"/>
+              <a:t>sel4test</a:t>
+            </a:r>
+            <a:r>
+              <a:rPr kumimoji="1" lang="zh-CN" altLang="en-US" sz="1600" dirty="0"/>
+              <a:t>测例。</a:t>
+            </a:r>
+            <a:endParaRPr kumimoji="1" lang="zh-CN" altLang="en-US" dirty="0"/>
+          </a:p>
+          <a:p>
+            <a:pPr lvl="1">
+              <a:buFont typeface="Arial" panose="02080604020202020204" pitchFamily="34" charset="0"/>
+              <a:buChar char="•"/>
+            </a:pPr>
+            <a:r>
+              <a:rPr kumimoji="1" lang="en-US" altLang="zh-CN" dirty="0"/>
+              <a:t>sel4</a:t>
+            </a:r>
+            <a:r>
+              <a:rPr kumimoji="1" lang="zh-CN" altLang="en-US" dirty="0"/>
+              <a:t>内核中对系统调用做了一层封装，</a:t>
+            </a:r>
+            <a:r>
+              <a:rPr kumimoji="1" lang="en-US" altLang="zh-CN" dirty="0"/>
+              <a:t>sel4test</a:t>
+            </a:r>
+            <a:r>
+              <a:rPr kumimoji="1" lang="zh-CN" altLang="en-US" dirty="0"/>
+              <a:t>的依赖库中会使用这层封装，将封装分离后单独编译</a:t>
+            </a:r>
+            <a:r>
+              <a:rPr kumimoji="1" lang="en-US" altLang="zh-CN" dirty="0"/>
+              <a:t>sel4test</a:t>
+            </a:r>
+            <a:r>
+              <a:rPr kumimoji="1" lang="zh-CN" altLang="en-US" dirty="0"/>
+              <a:t>，加载进入内核执行。</a:t>
+            </a:r>
             <a:endParaRPr kumimoji="1" lang="en-US" altLang="zh-CN" dirty="0"/>
           </a:p>
           <a:p>
-            <a:pPr lvl="1"/>
+            <a:pPr marL="0" indent="0">
+              <a:buFont typeface="Arial" panose="02080604020202020204" pitchFamily="34" charset="0"/>
+              <a:buNone/>
+            </a:pPr>
+            <a:endParaRPr kumimoji="1" lang="zh-CN" altLang="en-US" dirty="0"/>
+          </a:p>
+        </p:txBody>
+      </p:sp>
+      <p:sp>
+        <p:nvSpPr>
+          <p:cNvPr id="3" name="标题 2"/>
+          <p:cNvSpPr>
+            <a:spLocks noGrp="1"/>
+          </p:cNvSpPr>
+          <p:nvPr>
+            <p:ph type="title"/>
+          </p:nvPr>
+        </p:nvSpPr>
+        <p:spPr/>
+        <p:txBody>
+          <a:bodyPr/>
+          <a:lstStyle/>
+          <a:p>
             <a:r>
               <a:rPr kumimoji="1" lang="zh-CN" altLang="en-US" dirty="0"/>
-              <a:t>撰写论文</a:t>
-            </a:r>
-            <a:endParaRPr kumimoji="1" lang="en-US" altLang="zh-CN" dirty="0"/>
-          </a:p>
-        </p:txBody>
-      </p:sp>
-      <p:sp>
-        <p:nvSpPr>
-          <p:cNvPr id="3" name="标题 2"/>
-          <p:cNvSpPr>
-            <a:spLocks noGrp="1"/>
-          </p:cNvSpPr>
-          <p:nvPr>
-            <p:ph type="title"/>
-          </p:nvPr>
-        </p:nvSpPr>
-        <p:spPr/>
-        <p:txBody>
-          <a:bodyPr/>
-          <a:lstStyle/>
-          <a:p>
-            <a:r>
-              <a:rPr kumimoji="1" lang="zh-CN" altLang="en-US" dirty="0"/>
-              <a:t>后续规划</a:t>
+              <a:t>后续工作</a:t>
             </a:r>
             <a:endParaRPr kumimoji="1" lang="zh-CN" altLang="en-US" dirty="0"/>
           </a:p>
         </p:txBody>
       </p:sp>
+      <p:pic>
+        <p:nvPicPr>
+          <p:cNvPr id="5" name="图片 3"/>
+          <p:cNvPicPr>
+            <a:picLocks noChangeAspect="1"/>
+          </p:cNvPicPr>
+          <p:nvPr>
+            <p:custDataLst>
+              <p:tags r:id="rId1"/>
+            </p:custDataLst>
+          </p:nvPr>
+        </p:nvPicPr>
+        <p:blipFill>
+          <a:blip r:embed="rId2"/>
+          <a:stretch>
+            <a:fillRect/>
+          </a:stretch>
+        </p:blipFill>
+        <p:spPr>
+          <a:xfrm>
+            <a:off x="6055995" y="2136140"/>
+            <a:ext cx="4389120" cy="2217420"/>
+          </a:xfrm>
+          <a:prstGeom prst="rect">
+            <a:avLst/>
+          </a:prstGeom>
+        </p:spPr>
+      </p:pic>
     </p:spTree>
   </p:cSld>
   <p:clrMapOvr>
@@ -5246,6 +5249,159 @@
       </p:grpSpPr>
       <p:sp>
         <p:nvSpPr>
+          <p:cNvPr id="2" name="内容占位符 1"/>
+          <p:cNvSpPr>
+            <a:spLocks noGrp="1"/>
+          </p:cNvSpPr>
+          <p:nvPr>
+            <p:ph idx="1"/>
+          </p:nvPr>
+        </p:nvSpPr>
+        <p:spPr>
+          <a:xfrm>
+            <a:off x="835307" y="2048614"/>
+            <a:ext cx="10521387" cy="3678303"/>
+          </a:xfrm>
+        </p:spPr>
+        <p:txBody>
+          <a:bodyPr>
+            <a:normAutofit/>
+          </a:bodyPr>
+          <a:lstStyle/>
+          <a:p>
+            <a:r>
+              <a:rPr kumimoji="1" lang="zh-CN" altLang="en-US" dirty="0"/>
+              <a:t>中期</a:t>
+            </a:r>
+            <a:r>
+              <a:rPr kumimoji="1" lang="en-US" altLang="zh-CN" dirty="0"/>
+              <a:t>——9</a:t>
+            </a:r>
+            <a:r>
+              <a:rPr kumimoji="1" lang="zh-CN" altLang="en-US" dirty="0"/>
+              <a:t>周</a:t>
+            </a:r>
+            <a:endParaRPr kumimoji="1" lang="en-US" altLang="zh-CN" dirty="0"/>
+          </a:p>
+          <a:p>
+            <a:pPr lvl="1"/>
+            <a:r>
+              <a:rPr kumimoji="1" lang="zh-CN" altLang="en-US" dirty="0"/>
+              <a:t>修改地址空间</a:t>
+            </a:r>
+            <a:r>
+              <a:rPr kumimoji="1" lang="en-US" altLang="zh-CN" dirty="0"/>
+              <a:t>;</a:t>
+            </a:r>
+            <a:r>
+              <a:rPr kumimoji="1" lang="zh-CN" altLang="en-US" dirty="0"/>
+              <a:t>测试</a:t>
+            </a:r>
+            <a:r>
+              <a:rPr kumimoji="1" lang="en-US" altLang="zh-CN" dirty="0"/>
+              <a:t>notification;</a:t>
+            </a:r>
+            <a:r>
+              <a:rPr kumimoji="1" lang="zh-CN" altLang="en-US" dirty="0"/>
+              <a:t>更改启动方式，添加系统调用</a:t>
+            </a:r>
+            <a:endParaRPr kumimoji="1" lang="en-US" altLang="zh-CN" dirty="0"/>
+          </a:p>
+          <a:p>
+            <a:r>
+              <a:rPr kumimoji="1" lang="en-US" altLang="zh-CN" dirty="0"/>
+              <a:t>10</a:t>
+            </a:r>
+            <a:r>
+              <a:rPr kumimoji="1" lang="zh-CN" altLang="en-US" dirty="0"/>
+              <a:t>周</a:t>
+            </a:r>
+            <a:r>
+              <a:rPr kumimoji="1" lang="en-US" altLang="zh-CN" dirty="0"/>
+              <a:t>——15</a:t>
+            </a:r>
+            <a:r>
+              <a:rPr kumimoji="1" lang="zh-CN" altLang="en-US" dirty="0"/>
+              <a:t>周</a:t>
+            </a:r>
+            <a:endParaRPr kumimoji="1" lang="en-US" altLang="zh-CN" dirty="0"/>
+          </a:p>
+          <a:p>
+            <a:pPr lvl="1"/>
+            <a:r>
+              <a:rPr kumimoji="1" lang="zh-CN" altLang="en-US" dirty="0"/>
+              <a:t>使内核支持尽可能多的</a:t>
+            </a:r>
+            <a:r>
+              <a:rPr kumimoji="1" lang="en-US" altLang="zh-CN" dirty="0"/>
+              <a:t>sel4test</a:t>
+            </a:r>
+            <a:r>
+              <a:rPr kumimoji="1" lang="zh-CN" altLang="en-US" dirty="0"/>
+              <a:t>测例</a:t>
+            </a:r>
+            <a:endParaRPr kumimoji="1" lang="en-US" altLang="zh-CN" dirty="0"/>
+          </a:p>
+          <a:p>
+            <a:pPr lvl="1"/>
+            <a:r>
+              <a:rPr kumimoji="1" lang="zh-CN" altLang="en-US" dirty="0"/>
+              <a:t>撰写论文</a:t>
+            </a:r>
+            <a:endParaRPr kumimoji="1" lang="en-US" altLang="zh-CN" dirty="0"/>
+          </a:p>
+        </p:txBody>
+      </p:sp>
+      <p:sp>
+        <p:nvSpPr>
+          <p:cNvPr id="3" name="标题 2"/>
+          <p:cNvSpPr>
+            <a:spLocks noGrp="1"/>
+          </p:cNvSpPr>
+          <p:nvPr>
+            <p:ph type="title"/>
+          </p:nvPr>
+        </p:nvSpPr>
+        <p:spPr/>
+        <p:txBody>
+          <a:bodyPr/>
+          <a:lstStyle/>
+          <a:p>
+            <a:r>
+              <a:rPr kumimoji="1" lang="zh-CN" altLang="en-US" dirty="0"/>
+              <a:t>后续规划</a:t>
+            </a:r>
+            <a:endParaRPr kumimoji="1" lang="zh-CN" altLang="en-US" dirty="0"/>
+          </a:p>
+        </p:txBody>
+      </p:sp>
+    </p:spTree>
+  </p:cSld>
+  <p:clrMapOvr>
+    <a:masterClrMapping/>
+  </p:clrMapOvr>
+</p:sld>
+</file>
+
+<file path=ppt/slides/slide14.xml><?xml version="1.0" encoding="utf-8"?>
+<p:sld xmlns:a="http://schemas.openxmlformats.org/drawingml/2006/main" xmlns:r="http://schemas.openxmlformats.org/officeDocument/2006/relationships" xmlns:p="http://schemas.openxmlformats.org/presentationml/2006/main">
+  <p:cSld>
+    <p:spTree>
+      <p:nvGrpSpPr>
+        <p:cNvPr id="1" name=""/>
+        <p:cNvGrpSpPr/>
+        <p:nvPr/>
+      </p:nvGrpSpPr>
+      <p:grpSpPr>
+        <a:xfrm>
+          <a:off x="0" y="0"/>
+          <a:ext cx="0" cy="0"/>
+          <a:chOff x="0" y="0"/>
+          <a:chExt cx="0" cy="0"/>
+        </a:xfrm>
+      </p:grpSpPr>
+      <p:sp>
+        <p:nvSpPr>
           <p:cNvPr id="4" name="标题 3"/>
           <p:cNvSpPr>
             <a:spLocks noGrp="1"/>
@@ -5907,7 +6063,7 @@
             </a:r>
             <a:r>
               <a:rPr lang="en-US" altLang="zh-CN" sz="1600"/>
-              <a:t>send recv</a:t>
+              <a:t>send recv NbSend</a:t>
             </a:r>
             <a:r>
               <a:rPr lang="zh-CN" altLang="en-US" sz="1600"/>
@@ -6088,7 +6244,7 @@
             </a:pPr>
             <a:r>
               <a:rPr lang="zh-CN" altLang="en-US"/>
-              <a:t>根据指针在</a:t>
+              <a:t>根据索引在</a:t>
             </a:r>
             <a:r>
               <a:rPr lang="en-US" altLang="zh-CN"/>
@@ -6172,7 +6328,7 @@
         </p:blipFill>
         <p:spPr>
           <a:xfrm>
-            <a:off x="6654165" y="873760"/>
+            <a:off x="1167765" y="5293360"/>
             <a:ext cx="3314700" cy="1165860"/>
           </a:xfrm>
           <a:prstGeom prst="rect">
@@ -6196,7 +6352,7 @@
         </p:blipFill>
         <p:spPr>
           <a:xfrm>
-            <a:off x="1062355" y="5234305"/>
+            <a:off x="6676390" y="923925"/>
             <a:ext cx="4053840" cy="1337310"/>
           </a:xfrm>
           <a:prstGeom prst="rect">
@@ -6278,24 +6434,12 @@
               <a:buChar char="•"/>
             </a:pPr>
             <a:r>
-              <a:rPr kumimoji="1" lang="zh-CN" altLang="en-US" dirty="0"/>
-              <a:t>页表交由</a:t>
-            </a:r>
-            <a:r>
-              <a:rPr kumimoji="1" lang="en-US" altLang="zh-CN" dirty="0"/>
-              <a:t>frame_cap</a:t>
-            </a:r>
-            <a:r>
-              <a:rPr kumimoji="1" lang="zh-CN" altLang="en-US" dirty="0"/>
-              <a:t>管理，</a:t>
-            </a:r>
-            <a:r>
               <a:rPr kumimoji="1" lang="en-US" altLang="zh-CN" dirty="0"/>
               <a:t>map</a:t>
             </a:r>
             <a:r>
               <a:rPr kumimoji="1" lang="zh-CN" altLang="en-US" dirty="0"/>
-              <a:t>一个虚拟地址的同时会向用户</a:t>
+              <a:t>一个虚拟地址的同时会向用户程序</a:t>
             </a:r>
             <a:r>
               <a:rPr kumimoji="1" lang="en-US" altLang="zh-CN" dirty="0"/>
@@ -6411,6 +6555,30 @@
           </a:prstGeom>
         </p:spPr>
       </p:pic>
+      <p:pic>
+        <p:nvPicPr>
+          <p:cNvPr id="4" name="Picture 3"/>
+          <p:cNvPicPr>
+            <a:picLocks noChangeAspect="1"/>
+          </p:cNvPicPr>
+          <p:nvPr/>
+        </p:nvPicPr>
+        <p:blipFill>
+          <a:blip r:embed="rId3"/>
+          <a:stretch>
+            <a:fillRect/>
+          </a:stretch>
+        </p:blipFill>
+        <p:spPr>
+          <a:xfrm>
+            <a:off x="1237615" y="3031490"/>
+            <a:ext cx="3263900" cy="274955"/>
+          </a:xfrm>
+          <a:prstGeom prst="rect">
+            <a:avLst/>
+          </a:prstGeom>
+        </p:spPr>
+      </p:pic>
     </p:spTree>
   </p:cSld>
   <p:clrMapOvr>
@@ -6529,7 +6697,7 @@
             </a:pPr>
             <a:r>
               <a:rPr kumimoji="1" lang="zh-CN" altLang="en-US" dirty="0"/>
-              <a:t>支持异步的传递信号（该部分代码已完成，尚未进行测试）</a:t>
+              <a:t>支持异步的信号传递功能（该部分代码已完成，尚未进行测试）</a:t>
             </a:r>
             <a:endParaRPr kumimoji="1" lang="zh-CN" altLang="en-US" dirty="0"/>
           </a:p>
@@ -6588,6 +6756,12 @@
     <a:masterClrMapping/>
   </p:clrMapOvr>
 </p:sld>
+</file>
+
+<file path=ppt/tags/tag1.xml><?xml version="1.0" encoding="utf-8"?>
+<p:tagLst xmlns:p="http://schemas.openxmlformats.org/presentationml/2006/main">
+  <p:tag name="KSO_WM_UNIT_PLACING_PICTURE_USER_VIEWPORT" val="{&quot;height&quot;:4820,&quot;width&quot;:9540}"/>
+</p:tagLst>
 </file>
 
 <file path=ppt/theme/theme1.xml><?xml version="1.0" encoding="utf-8"?>

</xml_diff>

<commit_message>
translate decode tcb invocation part
</commit_message>
<xml_diff>
--- a/record/中期答辩——李龙昊.pptx
+++ b/record/中期答辩——李龙昊.pptx
@@ -19,9 +19,8 @@
     <p:sldId id="288" r:id="rId12"/>
     <p:sldId id="301" r:id="rId13"/>
     <p:sldId id="283" r:id="rId14"/>
-    <p:sldId id="307" r:id="rId15"/>
-    <p:sldId id="302" r:id="rId16"/>
-    <p:sldId id="282" r:id="rId17"/>
+    <p:sldId id="302" r:id="rId15"/>
+    <p:sldId id="282" r:id="rId16"/>
   </p:sldIdLst>
   <p:sldSz cx="12192000" cy="6858000"/>
   <p:notesSz cx="6858000" cy="9144000"/>
@@ -4968,6 +4967,38 @@
             </a:r>
             <a:endParaRPr kumimoji="1" lang="zh-CN" altLang="en-US" dirty="0"/>
           </a:p>
+          <a:p>
+            <a:pPr>
+              <a:buFont typeface="Arial" panose="02080604020202020204" pitchFamily="34" charset="0"/>
+              <a:buChar char="•"/>
+            </a:pPr>
+            <a:r>
+              <a:rPr kumimoji="1" lang="zh-CN" altLang="en-US" dirty="0">
+                <a:sym typeface="+mn-ea"/>
+              </a:rPr>
+              <a:t>支持尽可能多的</a:t>
+            </a:r>
+            <a:r>
+              <a:rPr kumimoji="1" lang="en-US" altLang="zh-CN" dirty="0">
+                <a:sym typeface="+mn-ea"/>
+              </a:rPr>
+              <a:t>sel4test</a:t>
+            </a:r>
+            <a:r>
+              <a:rPr kumimoji="1" lang="zh-CN" altLang="en-US" dirty="0">
+                <a:sym typeface="+mn-ea"/>
+              </a:rPr>
+              <a:t>测例</a:t>
+            </a:r>
+            <a:endParaRPr kumimoji="1" lang="zh-CN" altLang="en-US" dirty="0"/>
+          </a:p>
+          <a:p>
+            <a:pPr>
+              <a:buFont typeface="Arial" panose="02080604020202020204" pitchFamily="34" charset="0"/>
+              <a:buChar char="•"/>
+            </a:pPr>
+            <a:endParaRPr kumimoji="1" lang="zh-CN" altLang="en-US" dirty="0"/>
+          </a:p>
         </p:txBody>
       </p:sp>
       <p:sp>
@@ -5078,150 +5109,126 @@
         </p:nvSpPr>
         <p:spPr>
           <a:xfrm>
-            <a:off x="833120" y="2180590"/>
-            <a:ext cx="4358640" cy="3678555"/>
+            <a:off x="835307" y="2048614"/>
+            <a:ext cx="10521387" cy="3678303"/>
           </a:xfrm>
         </p:spPr>
         <p:txBody>
+          <a:bodyPr>
+            <a:normAutofit/>
+          </a:bodyPr>
+          <a:lstStyle/>
+          <a:p>
+            <a:r>
+              <a:rPr kumimoji="1" lang="zh-CN" altLang="en-US" dirty="0"/>
+              <a:t>中期</a:t>
+            </a:r>
+            <a:r>
+              <a:rPr kumimoji="1" lang="en-US" altLang="zh-CN" dirty="0"/>
+              <a:t>——</a:t>
+            </a:r>
+            <a:r>
+              <a:rPr kumimoji="1" lang="x-none" altLang="en-US" dirty="0"/>
+              <a:t>10</a:t>
+            </a:r>
+            <a:r>
+              <a:rPr kumimoji="1" lang="zh-CN" altLang="en-US" dirty="0"/>
+              <a:t>周</a:t>
+            </a:r>
+            <a:endParaRPr kumimoji="1" lang="en-US" altLang="zh-CN" dirty="0"/>
+          </a:p>
+          <a:p>
+            <a:pPr lvl="1"/>
+            <a:r>
+              <a:rPr kumimoji="1" lang="zh-CN" altLang="en-US" dirty="0"/>
+              <a:t>修改地址空间</a:t>
+            </a:r>
+            <a:r>
+              <a:rPr kumimoji="1" lang="en-US" altLang="zh-CN" dirty="0"/>
+              <a:t>;</a:t>
+            </a:r>
+            <a:r>
+              <a:rPr kumimoji="1" lang="zh-CN" altLang="en-US" dirty="0"/>
+              <a:t>测试</a:t>
+            </a:r>
+            <a:r>
+              <a:rPr kumimoji="1" lang="en-US" altLang="zh-CN" dirty="0"/>
+              <a:t>notification;</a:t>
+            </a:r>
+            <a:r>
+              <a:rPr kumimoji="1" lang="zh-CN" altLang="en-US" dirty="0"/>
+              <a:t>更改启动方式，添加系统调用</a:t>
+            </a:r>
+            <a:endParaRPr kumimoji="1" lang="en-US" altLang="zh-CN" dirty="0"/>
+          </a:p>
+          <a:p>
+            <a:r>
+              <a:rPr kumimoji="1" lang="en-US" altLang="zh-CN" dirty="0"/>
+              <a:t>10</a:t>
+            </a:r>
+            <a:r>
+              <a:rPr kumimoji="1" lang="zh-CN" altLang="en-US" dirty="0"/>
+              <a:t>周</a:t>
+            </a:r>
+            <a:r>
+              <a:rPr kumimoji="1" lang="en-US" altLang="zh-CN" dirty="0"/>
+              <a:t>——15</a:t>
+            </a:r>
+            <a:r>
+              <a:rPr kumimoji="1" lang="zh-CN" altLang="en-US" dirty="0"/>
+              <a:t>周</a:t>
+            </a:r>
+            <a:endParaRPr kumimoji="1" lang="en-US" altLang="zh-CN" dirty="0"/>
+          </a:p>
+          <a:p>
+            <a:pPr lvl="1"/>
+            <a:r>
+              <a:rPr kumimoji="1" lang="zh-CN" altLang="en-US" dirty="0"/>
+              <a:t>使内核支持尽可能多的</a:t>
+            </a:r>
+            <a:r>
+              <a:rPr kumimoji="1" lang="en-US" altLang="zh-CN" dirty="0"/>
+              <a:t>sel4test</a:t>
+            </a:r>
+            <a:r>
+              <a:rPr kumimoji="1" lang="zh-CN" altLang="en-US" dirty="0"/>
+              <a:t>测例</a:t>
+            </a:r>
+            <a:endParaRPr kumimoji="1" lang="en-US" altLang="zh-CN" dirty="0"/>
+          </a:p>
+          <a:p>
+            <a:pPr lvl="1"/>
+            <a:r>
+              <a:rPr kumimoji="1" lang="zh-CN" altLang="en-US" dirty="0"/>
+              <a:t>撰写论文</a:t>
+            </a:r>
+            <a:endParaRPr kumimoji="1" lang="en-US" altLang="zh-CN" dirty="0"/>
+          </a:p>
+        </p:txBody>
+      </p:sp>
+      <p:sp>
+        <p:nvSpPr>
+          <p:cNvPr id="3" name="标题 2"/>
+          <p:cNvSpPr>
+            <a:spLocks noGrp="1"/>
+          </p:cNvSpPr>
+          <p:nvPr>
+            <p:ph type="title"/>
+          </p:nvPr>
+        </p:nvSpPr>
+        <p:spPr/>
+        <p:txBody>
           <a:bodyPr/>
           <a:lstStyle/>
           <a:p>
-            <a:pPr>
-              <a:buFont typeface="Arial" panose="02080604020202020204" pitchFamily="34" charset="0"/>
-              <a:buChar char="•"/>
-            </a:pPr>
             <a:r>
               <a:rPr kumimoji="1" lang="zh-CN" altLang="en-US" dirty="0"/>
-              <a:t>支持尽可能多的</a:t>
-            </a:r>
-            <a:r>
-              <a:rPr kumimoji="1" lang="en-US" altLang="zh-CN" dirty="0"/>
-              <a:t>sel4test</a:t>
-            </a:r>
-            <a:r>
-              <a:rPr kumimoji="1" lang="zh-CN" altLang="en-US" dirty="0"/>
-              <a:t>测例</a:t>
+              <a:t>后续规划</a:t>
             </a:r>
             <a:endParaRPr kumimoji="1" lang="zh-CN" altLang="en-US" dirty="0"/>
           </a:p>
-          <a:p>
-            <a:pPr lvl="1">
-              <a:buFont typeface="Arial" panose="02080604020202020204" pitchFamily="34" charset="0"/>
-              <a:buChar char="•"/>
-            </a:pPr>
-            <a:r>
-              <a:rPr kumimoji="1" lang="zh-CN" altLang="en-US" sz="1600" dirty="0"/>
-              <a:t>用</a:t>
-            </a:r>
-            <a:r>
-              <a:rPr kumimoji="1" lang="en-US" altLang="zh-CN" sz="1600" dirty="0"/>
-              <a:t>rust</a:t>
-            </a:r>
-            <a:r>
-              <a:rPr kumimoji="1" lang="zh-CN" altLang="en-US" sz="1600" dirty="0"/>
-              <a:t>在自己搭建的用户环境中复现</a:t>
-            </a:r>
-            <a:r>
-              <a:rPr kumimoji="1" lang="en-US" altLang="zh-CN" sz="1600" dirty="0"/>
-              <a:t>sel4test</a:t>
-            </a:r>
-            <a:r>
-              <a:rPr kumimoji="1" lang="zh-CN" altLang="en-US" sz="1600" dirty="0"/>
-              <a:t>测例。</a:t>
-            </a:r>
-            <a:endParaRPr kumimoji="1" lang="zh-CN" altLang="en-US" dirty="0"/>
-          </a:p>
-          <a:p>
-            <a:pPr lvl="1">
-              <a:buFont typeface="Arial" panose="02080604020202020204" pitchFamily="34" charset="0"/>
-              <a:buChar char="•"/>
-            </a:pPr>
-            <a:r>
-              <a:rPr kumimoji="1" lang="en-US" altLang="zh-CN" dirty="0"/>
-              <a:t>sel4</a:t>
-            </a:r>
-            <a:r>
-              <a:rPr kumimoji="1" lang="zh-CN" altLang="en-US" dirty="0"/>
-              <a:t>内核中对系统调用做了一层封装，</a:t>
-            </a:r>
-            <a:r>
-              <a:rPr kumimoji="1" lang="en-US" altLang="zh-CN" dirty="0"/>
-              <a:t>sel4test</a:t>
-            </a:r>
-            <a:r>
-              <a:rPr kumimoji="1" lang="zh-CN" altLang="en-US" dirty="0"/>
-              <a:t>的依赖库中会使用这层封装，将封装分离后单独编译</a:t>
-            </a:r>
-            <a:r>
-              <a:rPr kumimoji="1" lang="en-US" altLang="zh-CN" dirty="0"/>
-              <a:t>sel4test</a:t>
-            </a:r>
-            <a:r>
-              <a:rPr kumimoji="1" lang="zh-CN" altLang="en-US" dirty="0"/>
-              <a:t>，加载进入内核执行。</a:t>
-            </a:r>
-            <a:endParaRPr kumimoji="1" lang="en-US" altLang="zh-CN" dirty="0"/>
-          </a:p>
-          <a:p>
-            <a:pPr marL="0" indent="0">
-              <a:buFont typeface="Arial" panose="02080604020202020204" pitchFamily="34" charset="0"/>
-              <a:buNone/>
-            </a:pPr>
-            <a:endParaRPr kumimoji="1" lang="zh-CN" altLang="en-US" dirty="0"/>
-          </a:p>
-        </p:txBody>
-      </p:sp>
-      <p:sp>
-        <p:nvSpPr>
-          <p:cNvPr id="3" name="标题 2"/>
-          <p:cNvSpPr>
-            <a:spLocks noGrp="1"/>
-          </p:cNvSpPr>
-          <p:nvPr>
-            <p:ph type="title"/>
-          </p:nvPr>
-        </p:nvSpPr>
-        <p:spPr/>
-        <p:txBody>
-          <a:bodyPr/>
-          <a:lstStyle/>
-          <a:p>
-            <a:r>
-              <a:rPr kumimoji="1" lang="zh-CN" altLang="en-US" dirty="0"/>
-              <a:t>后续工作</a:t>
-            </a:r>
-            <a:endParaRPr kumimoji="1" lang="zh-CN" altLang="en-US" dirty="0"/>
-          </a:p>
-        </p:txBody>
-      </p:sp>
-      <p:pic>
-        <p:nvPicPr>
-          <p:cNvPr id="5" name="图片 3"/>
-          <p:cNvPicPr>
-            <a:picLocks noChangeAspect="1"/>
-          </p:cNvPicPr>
-          <p:nvPr>
-            <p:custDataLst>
-              <p:tags r:id="rId1"/>
-            </p:custDataLst>
-          </p:nvPr>
-        </p:nvPicPr>
-        <p:blipFill>
-          <a:blip r:embed="rId2"/>
-          <a:stretch>
-            <a:fillRect/>
-          </a:stretch>
-        </p:blipFill>
-        <p:spPr>
-          <a:xfrm>
-            <a:off x="6055995" y="2136140"/>
-            <a:ext cx="4389120" cy="2217420"/>
-          </a:xfrm>
-          <a:prstGeom prst="rect">
-            <a:avLst/>
-          </a:prstGeom>
-        </p:spPr>
-      </p:pic>
+        </p:txBody>
+      </p:sp>
     </p:spTree>
   </p:cSld>
   <p:clrMapOvr>
@@ -5249,159 +5256,6 @@
       </p:grpSpPr>
       <p:sp>
         <p:nvSpPr>
-          <p:cNvPr id="2" name="内容占位符 1"/>
-          <p:cNvSpPr>
-            <a:spLocks noGrp="1"/>
-          </p:cNvSpPr>
-          <p:nvPr>
-            <p:ph idx="1"/>
-          </p:nvPr>
-        </p:nvSpPr>
-        <p:spPr>
-          <a:xfrm>
-            <a:off x="835307" y="2048614"/>
-            <a:ext cx="10521387" cy="3678303"/>
-          </a:xfrm>
-        </p:spPr>
-        <p:txBody>
-          <a:bodyPr>
-            <a:normAutofit/>
-          </a:bodyPr>
-          <a:lstStyle/>
-          <a:p>
-            <a:r>
-              <a:rPr kumimoji="1" lang="zh-CN" altLang="en-US" dirty="0"/>
-              <a:t>中期</a:t>
-            </a:r>
-            <a:r>
-              <a:rPr kumimoji="1" lang="en-US" altLang="zh-CN" dirty="0"/>
-              <a:t>——9</a:t>
-            </a:r>
-            <a:r>
-              <a:rPr kumimoji="1" lang="zh-CN" altLang="en-US" dirty="0"/>
-              <a:t>周</a:t>
-            </a:r>
-            <a:endParaRPr kumimoji="1" lang="en-US" altLang="zh-CN" dirty="0"/>
-          </a:p>
-          <a:p>
-            <a:pPr lvl="1"/>
-            <a:r>
-              <a:rPr kumimoji="1" lang="zh-CN" altLang="en-US" dirty="0"/>
-              <a:t>修改地址空间</a:t>
-            </a:r>
-            <a:r>
-              <a:rPr kumimoji="1" lang="en-US" altLang="zh-CN" dirty="0"/>
-              <a:t>;</a:t>
-            </a:r>
-            <a:r>
-              <a:rPr kumimoji="1" lang="zh-CN" altLang="en-US" dirty="0"/>
-              <a:t>测试</a:t>
-            </a:r>
-            <a:r>
-              <a:rPr kumimoji="1" lang="en-US" altLang="zh-CN" dirty="0"/>
-              <a:t>notification;</a:t>
-            </a:r>
-            <a:r>
-              <a:rPr kumimoji="1" lang="zh-CN" altLang="en-US" dirty="0"/>
-              <a:t>更改启动方式，添加系统调用</a:t>
-            </a:r>
-            <a:endParaRPr kumimoji="1" lang="en-US" altLang="zh-CN" dirty="0"/>
-          </a:p>
-          <a:p>
-            <a:r>
-              <a:rPr kumimoji="1" lang="en-US" altLang="zh-CN" dirty="0"/>
-              <a:t>10</a:t>
-            </a:r>
-            <a:r>
-              <a:rPr kumimoji="1" lang="zh-CN" altLang="en-US" dirty="0"/>
-              <a:t>周</a:t>
-            </a:r>
-            <a:r>
-              <a:rPr kumimoji="1" lang="en-US" altLang="zh-CN" dirty="0"/>
-              <a:t>——15</a:t>
-            </a:r>
-            <a:r>
-              <a:rPr kumimoji="1" lang="zh-CN" altLang="en-US" dirty="0"/>
-              <a:t>周</a:t>
-            </a:r>
-            <a:endParaRPr kumimoji="1" lang="en-US" altLang="zh-CN" dirty="0"/>
-          </a:p>
-          <a:p>
-            <a:pPr lvl="1"/>
-            <a:r>
-              <a:rPr kumimoji="1" lang="zh-CN" altLang="en-US" dirty="0"/>
-              <a:t>使内核支持尽可能多的</a:t>
-            </a:r>
-            <a:r>
-              <a:rPr kumimoji="1" lang="en-US" altLang="zh-CN" dirty="0"/>
-              <a:t>sel4test</a:t>
-            </a:r>
-            <a:r>
-              <a:rPr kumimoji="1" lang="zh-CN" altLang="en-US" dirty="0"/>
-              <a:t>测例</a:t>
-            </a:r>
-            <a:endParaRPr kumimoji="1" lang="en-US" altLang="zh-CN" dirty="0"/>
-          </a:p>
-          <a:p>
-            <a:pPr lvl="1"/>
-            <a:r>
-              <a:rPr kumimoji="1" lang="zh-CN" altLang="en-US" dirty="0"/>
-              <a:t>撰写论文</a:t>
-            </a:r>
-            <a:endParaRPr kumimoji="1" lang="en-US" altLang="zh-CN" dirty="0"/>
-          </a:p>
-        </p:txBody>
-      </p:sp>
-      <p:sp>
-        <p:nvSpPr>
-          <p:cNvPr id="3" name="标题 2"/>
-          <p:cNvSpPr>
-            <a:spLocks noGrp="1"/>
-          </p:cNvSpPr>
-          <p:nvPr>
-            <p:ph type="title"/>
-          </p:nvPr>
-        </p:nvSpPr>
-        <p:spPr/>
-        <p:txBody>
-          <a:bodyPr/>
-          <a:lstStyle/>
-          <a:p>
-            <a:r>
-              <a:rPr kumimoji="1" lang="zh-CN" altLang="en-US" dirty="0"/>
-              <a:t>后续规划</a:t>
-            </a:r>
-            <a:endParaRPr kumimoji="1" lang="zh-CN" altLang="en-US" dirty="0"/>
-          </a:p>
-        </p:txBody>
-      </p:sp>
-    </p:spTree>
-  </p:cSld>
-  <p:clrMapOvr>
-    <a:masterClrMapping/>
-  </p:clrMapOvr>
-</p:sld>
-</file>
-
-<file path=ppt/slides/slide14.xml><?xml version="1.0" encoding="utf-8"?>
-<p:sld xmlns:a="http://schemas.openxmlformats.org/drawingml/2006/main" xmlns:r="http://schemas.openxmlformats.org/officeDocument/2006/relationships" xmlns:p="http://schemas.openxmlformats.org/presentationml/2006/main">
-  <p:cSld>
-    <p:spTree>
-      <p:nvGrpSpPr>
-        <p:cNvPr id="1" name=""/>
-        <p:cNvGrpSpPr/>
-        <p:nvPr/>
-      </p:nvGrpSpPr>
-      <p:grpSpPr>
-        <a:xfrm>
-          <a:off x="0" y="0"/>
-          <a:ext cx="0" cy="0"/>
-          <a:chOff x="0" y="0"/>
-          <a:chExt cx="0" cy="0"/>
-        </a:xfrm>
-      </p:grpSpPr>
-      <p:sp>
-        <p:nvSpPr>
           <p:cNvPr id="4" name="标题 3"/>
           <p:cNvSpPr>
             <a:spLocks noGrp="1"/>
@@ -5556,7 +5410,7 @@
             </a:r>
             <a:r>
               <a:rPr kumimoji="1" lang="zh-CN" altLang="en-US" dirty="0"/>
-              <a:t>的最主要功能</a:t>
+              <a:t>的主要功能</a:t>
             </a:r>
             <a:endParaRPr kumimoji="1" lang="zh-CN" altLang="en-US" dirty="0"/>
           </a:p>
@@ -5840,6 +5694,33 @@
             <a:endParaRPr kumimoji="1" lang="en-US" altLang="zh-CN" dirty="0"/>
           </a:p>
           <a:p>
+            <a:pPr>
+              <a:buFont typeface="Arial" panose="02080604020202020204" pitchFamily="34" charset="0"/>
+              <a:buChar char="•"/>
+            </a:pPr>
+            <a:r>
+              <a:rPr kumimoji="1" lang="zh-CN" altLang="en-US" dirty="0"/>
+              <a:t>已完成</a:t>
+            </a:r>
+            <a:r>
+              <a:rPr kumimoji="1" lang="en-US" altLang="zh-CN" dirty="0"/>
+              <a:t>7k</a:t>
+            </a:r>
+            <a:r>
+              <a:rPr kumimoji="1" lang="zh-CN" altLang="en-US" dirty="0"/>
+              <a:t>行代码的编写，仍需完成</a:t>
+            </a:r>
+            <a:r>
+              <a:rPr kumimoji="1" lang="en-US" altLang="zh-CN" dirty="0"/>
+              <a:t>2k</a:t>
+            </a:r>
+            <a:r>
+              <a:rPr kumimoji="1" lang="zh-CN" altLang="en-US" dirty="0"/>
+              <a:t>代码编写</a:t>
+            </a:r>
+            <a:endParaRPr kumimoji="1" lang="en-US" altLang="zh-CN" dirty="0"/>
+          </a:p>
+          <a:p>
             <a:pPr marL="0" indent="0">
               <a:buFont typeface="Arial" panose="02080604020202020204" pitchFamily="34" charset="0"/>
               <a:buNone/>
@@ -5955,7 +5836,7 @@
             </a:pPr>
             <a:r>
               <a:rPr lang="zh-CN" altLang="en-US"/>
-              <a:t>主要采用时间片轮转算法，当前域的线程时间片用尽后会调到下一个域选择优先级最高的线程继续执行。</a:t>
+              <a:t>主要采用时间片轮转算法，当前域的线程时间片用尽后会进入下一个域选择优先级最高的线程继续执行。</a:t>
             </a:r>
             <a:endParaRPr lang="zh-CN" altLang="en-US"/>
           </a:p>
@@ -6063,7 +5944,7 @@
             </a:r>
             <a:r>
               <a:rPr lang="en-US" altLang="zh-CN" sz="1600"/>
-              <a:t>send recv NbSend</a:t>
+              <a:t>send recv </a:t>
             </a:r>
             <a:r>
               <a:rPr lang="zh-CN" altLang="en-US" sz="1600"/>
@@ -6222,7 +6103,7 @@
             </a:r>
             <a:r>
               <a:rPr lang="zh-CN" altLang="en-US"/>
-              <a:t>特定属性的接口</a:t>
+              <a:t>特定信息的函数</a:t>
             </a:r>
             <a:endParaRPr lang="zh-CN" altLang="en-US"/>
           </a:p>
@@ -6233,7 +6114,7 @@
             </a:pPr>
             <a:r>
               <a:rPr lang="zh-CN" altLang="en-US"/>
-              <a:t>管理派生关系，维护双向链表的函数</a:t>
+              <a:t>维护双向链表的函数</a:t>
             </a:r>
             <a:endParaRPr lang="en-US" altLang="zh-CN"/>
           </a:p>
@@ -6248,7 +6129,7 @@
             </a:r>
             <a:r>
               <a:rPr lang="en-US" altLang="zh-CN"/>
-              <a:t>CSpace</a:t>
+              <a:t>CNode</a:t>
             </a:r>
             <a:r>
               <a:rPr lang="zh-CN" altLang="en-US"/>
@@ -6434,12 +6315,8 @@
               <a:buChar char="•"/>
             </a:pPr>
             <a:r>
-              <a:rPr kumimoji="1" lang="en-US" altLang="zh-CN" dirty="0"/>
-              <a:t>map</a:t>
-            </a:r>
-            <a:r>
               <a:rPr kumimoji="1" lang="zh-CN" altLang="en-US" dirty="0"/>
-              <a:t>一个虚拟地址的同时会向用户程序</a:t>
+              <a:t>虚拟地址分配物理页帧时会向用户程序</a:t>
             </a:r>
             <a:r>
               <a:rPr kumimoji="1" lang="en-US" altLang="zh-CN" dirty="0"/>
@@ -6616,7 +6493,7 @@
         </p:nvSpPr>
         <p:spPr>
           <a:xfrm>
-            <a:off x="833120" y="2180590"/>
+            <a:off x="835025" y="1608455"/>
             <a:ext cx="5115560" cy="3678555"/>
           </a:xfrm>
         </p:spPr>
@@ -6750,18 +6627,36 @@
           </a:prstGeom>
         </p:spPr>
       </p:pic>
+      <p:pic>
+        <p:nvPicPr>
+          <p:cNvPr id="5" name="Picture 4"/>
+          <p:cNvPicPr>
+            <a:picLocks noChangeAspect="1"/>
+          </p:cNvPicPr>
+          <p:nvPr/>
+        </p:nvPicPr>
+        <p:blipFill>
+          <a:blip r:embed="rId2"/>
+          <a:stretch>
+            <a:fillRect/>
+          </a:stretch>
+        </p:blipFill>
+        <p:spPr>
+          <a:xfrm>
+            <a:off x="490855" y="4562475"/>
+            <a:ext cx="5459730" cy="2110740"/>
+          </a:xfrm>
+          <a:prstGeom prst="rect">
+            <a:avLst/>
+          </a:prstGeom>
+        </p:spPr>
+      </p:pic>
     </p:spTree>
   </p:cSld>
   <p:clrMapOvr>
     <a:masterClrMapping/>
   </p:clrMapOvr>
 </p:sld>
-</file>
-
-<file path=ppt/tags/tag1.xml><?xml version="1.0" encoding="utf-8"?>
-<p:tagLst xmlns:p="http://schemas.openxmlformats.org/presentationml/2006/main">
-  <p:tag name="KSO_WM_UNIT_PLACING_PICTURE_USER_VIEWPORT" val="{&quot;height&quot;:4820,&quot;width&quot;:9540}"/>
-</p:tagLst>
 </file>
 
 <file path=ppt/theme/theme1.xml><?xml version="1.0" encoding="utf-8"?>

</xml_diff>